<commit_message>
Update report generator to have date ranges
</commit_message>
<xml_diff>
--- a/FlaskApp/generated/Learn5.pptx
+++ b/FlaskApp/generated/Learn5.pptx
@@ -3153,15 +3153,9 @@
                 <a:tableStyleId>{5C22544A-7EE6-4342-B048-85BDC9FD1C3A}</a:tableStyleId>
               </a:tblPr>
               <a:tblGrid>
-                <a:gridCol w="965200"/>
-                <a:gridCol w="965200"/>
-                <a:gridCol w="965200"/>
-                <a:gridCol w="965200"/>
-                <a:gridCol w="965200"/>
-                <a:gridCol w="965200"/>
-                <a:gridCol w="965200"/>
-                <a:gridCol w="965200"/>
-                <a:gridCol w="965200"/>
+                <a:gridCol w="2895600"/>
+                <a:gridCol w="2895600"/>
+                <a:gridCol w="2895600"/>
               </a:tblGrid>
               <a:tr h="304800">
                 <a:tc>
@@ -3169,78 +3163,6 @@
                     <a:bodyPr/>
                     <a:lstStyle/>
                     <a:p/>
-                  </a:txBody>
-                  <a:tcPr/>
-                </a:tc>
-                <a:tc>
-                  <a:txBody>
-                    <a:bodyPr/>
-                    <a:lstStyle/>
-                    <a:p>
-                      <a:r>
-                        <a:t>Communication Skills</a:t>
-                      </a:r>
-                    </a:p>
-                  </a:txBody>
-                  <a:tcPr/>
-                </a:tc>
-                <a:tc>
-                  <a:txBody>
-                    <a:bodyPr/>
-                    <a:lstStyle/>
-                    <a:p>
-                      <a:r>
-                        <a:t>First Impressions</a:t>
-                      </a:r>
-                    </a:p>
-                  </a:txBody>
-                  <a:tcPr/>
-                </a:tc>
-                <a:tc>
-                  <a:txBody>
-                    <a:bodyPr/>
-                    <a:lstStyle/>
-                    <a:p>
-                      <a:r>
-                        <a:t>Grooming English</a:t>
-                      </a:r>
-                    </a:p>
-                  </a:txBody>
-                  <a:tcPr/>
-                </a:tc>
-                <a:tc>
-                  <a:txBody>
-                    <a:bodyPr/>
-                    <a:lstStyle/>
-                    <a:p>
-                      <a:r>
-                        <a:t>Induction</a:t>
-                      </a:r>
-                    </a:p>
-                  </a:txBody>
-                  <a:tcPr/>
-                </a:tc>
-                <a:tc>
-                  <a:txBody>
-                    <a:bodyPr/>
-                    <a:lstStyle/>
-                    <a:p>
-                      <a:r>
-                        <a:t>Interpersonal Skills</a:t>
-                      </a:r>
-                    </a:p>
-                  </a:txBody>
-                  <a:tcPr/>
-                </a:tc>
-                <a:tc>
-                  <a:txBody>
-                    <a:bodyPr/>
-                    <a:lstStyle/>
-                    <a:p>
-                      <a:r>
-                        <a:t>Listening Skills</a:t>
-                      </a:r>
-                    </a:p>
                   </a:txBody>
                   <a:tcPr/>
                 </a:tc>
@@ -3276,6 +3198,44 @@
                     <a:lstStyle/>
                     <a:p>
                       <a:r>
+                        <a:t>Bangalore</a:t>
+                      </a:r>
+                    </a:p>
+                  </a:txBody>
+                  <a:tcPr/>
+                </a:tc>
+                <a:tc>
+                  <a:txBody>
+                    <a:bodyPr/>
+                    <a:lstStyle/>
+                    <a:p>
+                      <a:r>
+                        <a:t>16625</a:t>
+                      </a:r>
+                    </a:p>
+                  </a:txBody>
+                  <a:tcPr/>
+                </a:tc>
+                <a:tc>
+                  <a:txBody>
+                    <a:bodyPr/>
+                    <a:lstStyle/>
+                    <a:p>
+                      <a:r>
+                        <a:t>16625</a:t>
+                      </a:r>
+                    </a:p>
+                  </a:txBody>
+                  <a:tcPr/>
+                </a:tc>
+              </a:tr>
+              <a:tr h="304800">
+                <a:tc>
+                  <a:txBody>
+                    <a:bodyPr/>
+                    <a:lstStyle/>
+                    <a:p>
+                      <a:r>
                         <a:t>Hyderabad</a:t>
                       </a:r>
                     </a:p>
@@ -3288,79 +3248,7 @@
                     <a:lstStyle/>
                     <a:p>
                       <a:r>
-                        <a:t>3</a:t>
-                      </a:r>
-                    </a:p>
-                  </a:txBody>
-                  <a:tcPr/>
-                </a:tc>
-                <a:tc>
-                  <a:txBody>
-                    <a:bodyPr/>
-                    <a:lstStyle/>
-                    <a:p>
-                      <a:r>
-                        <a:t>14</a:t>
-                      </a:r>
-                    </a:p>
-                  </a:txBody>
-                  <a:tcPr/>
-                </a:tc>
-                <a:tc>
-                  <a:txBody>
-                    <a:bodyPr/>
-                    <a:lstStyle/>
-                    <a:p>
-                      <a:r>
-                        <a:t>0</a:t>
-                      </a:r>
-                    </a:p>
-                  </a:txBody>
-                  <a:tcPr/>
-                </a:tc>
-                <a:tc>
-                  <a:txBody>
-                    <a:bodyPr/>
-                    <a:lstStyle/>
-                    <a:p>
-                      <a:r>
-                        <a:t>0</a:t>
-                      </a:r>
-                    </a:p>
-                  </a:txBody>
-                  <a:tcPr/>
-                </a:tc>
-                <a:tc>
-                  <a:txBody>
-                    <a:bodyPr/>
-                    <a:lstStyle/>
-                    <a:p>
-                      <a:r>
-                        <a:t>17</a:t>
-                      </a:r>
-                    </a:p>
-                  </a:txBody>
-                  <a:tcPr/>
-                </a:tc>
-                <a:tc>
-                  <a:txBody>
-                    <a:bodyPr/>
-                    <a:lstStyle/>
-                    <a:p>
-                      <a:r>
-                        <a:t>0</a:t>
-                      </a:r>
-                    </a:p>
-                  </a:txBody>
-                  <a:tcPr/>
-                </a:tc>
-                <a:tc>
-                  <a:txBody>
-                    <a:bodyPr/>
-                    <a:lstStyle/>
-                    <a:p>
-                      <a:r>
-                        <a:t>5</a:t>
+                        <a:t>39</a:t>
                       </a:r>
                     </a:p>
                   </a:txBody>
@@ -3386,189 +3274,7 @@
                     <a:lstStyle/>
                     <a:p>
                       <a:r>
-                        <a:t>Bangalore</a:t>
-                      </a:r>
-                    </a:p>
-                  </a:txBody>
-                  <a:tcPr/>
-                </a:tc>
-                <a:tc>
-                  <a:txBody>
-                    <a:bodyPr/>
-                    <a:lstStyle/>
-                    <a:p>
-                      <a:r>
-                        <a:t>0</a:t>
-                      </a:r>
-                    </a:p>
-                  </a:txBody>
-                  <a:tcPr/>
-                </a:tc>
-                <a:tc>
-                  <a:txBody>
-                    <a:bodyPr/>
-                    <a:lstStyle/>
-                    <a:p>
-                      <a:r>
-                        <a:t>79</a:t>
-                      </a:r>
-                    </a:p>
-                  </a:txBody>
-                  <a:tcPr/>
-                </a:tc>
-                <a:tc>
-                  <a:txBody>
-                    <a:bodyPr/>
-                    <a:lstStyle/>
-                    <a:p>
-                      <a:r>
-                        <a:t>91</a:t>
-                      </a:r>
-                    </a:p>
-                  </a:txBody>
-                  <a:tcPr/>
-                </a:tc>
-                <a:tc>
-                  <a:txBody>
-                    <a:bodyPr/>
-                    <a:lstStyle/>
-                    <a:p>
-                      <a:r>
-                        <a:t>22</a:t>
-                      </a:r>
-                    </a:p>
-                  </a:txBody>
-                  <a:tcPr/>
-                </a:tc>
-                <a:tc>
-                  <a:txBody>
-                    <a:bodyPr/>
-                    <a:lstStyle/>
-                    <a:p>
-                      <a:r>
-                        <a:t>6</a:t>
-                      </a:r>
-                    </a:p>
-                  </a:txBody>
-                  <a:tcPr/>
-                </a:tc>
-                <a:tc>
-                  <a:txBody>
-                    <a:bodyPr/>
-                    <a:lstStyle/>
-                    <a:p>
-                      <a:r>
-                        <a:t>2</a:t>
-                      </a:r>
-                    </a:p>
-                  </a:txBody>
-                  <a:tcPr/>
-                </a:tc>
-                <a:tc>
-                  <a:txBody>
-                    <a:bodyPr/>
-                    <a:lstStyle/>
-                    <a:p>
-                      <a:r>
-                        <a:t>16425</a:t>
-                      </a:r>
-                    </a:p>
-                  </a:txBody>
-                  <a:tcPr/>
-                </a:tc>
-                <a:tc>
-                  <a:txBody>
-                    <a:bodyPr/>
-                    <a:lstStyle/>
-                    <a:p>
-                      <a:r>
-                        <a:t>16625</a:t>
-                      </a:r>
-                    </a:p>
-                  </a:txBody>
-                  <a:tcPr/>
-                </a:tc>
-              </a:tr>
-              <a:tr h="304800">
-                <a:tc>
-                  <a:txBody>
-                    <a:bodyPr/>
-                    <a:lstStyle/>
-                    <a:p>
-                      <a:r>
                         <a:t>Administration</a:t>
-                      </a:r>
-                    </a:p>
-                  </a:txBody>
-                  <a:tcPr/>
-                </a:tc>
-                <a:tc>
-                  <a:txBody>
-                    <a:bodyPr/>
-                    <a:lstStyle/>
-                    <a:p>
-                      <a:r>
-                        <a:t>0</a:t>
-                      </a:r>
-                    </a:p>
-                  </a:txBody>
-                  <a:tcPr/>
-                </a:tc>
-                <a:tc>
-                  <a:txBody>
-                    <a:bodyPr/>
-                    <a:lstStyle/>
-                    <a:p>
-                      <a:r>
-                        <a:t>0</a:t>
-                      </a:r>
-                    </a:p>
-                  </a:txBody>
-                  <a:tcPr/>
-                </a:tc>
-                <a:tc>
-                  <a:txBody>
-                    <a:bodyPr/>
-                    <a:lstStyle/>
-                    <a:p>
-                      <a:r>
-                        <a:t>0</a:t>
-                      </a:r>
-                    </a:p>
-                  </a:txBody>
-                  <a:tcPr/>
-                </a:tc>
-                <a:tc>
-                  <a:txBody>
-                    <a:bodyPr/>
-                    <a:lstStyle/>
-                    <a:p>
-                      <a:r>
-                        <a:t>0</a:t>
-                      </a:r>
-                    </a:p>
-                  </a:txBody>
-                  <a:tcPr/>
-                </a:tc>
-                <a:tc>
-                  <a:txBody>
-                    <a:bodyPr/>
-                    <a:lstStyle/>
-                    <a:p>
-                      <a:r>
-                        <a:t>0</a:t>
-                      </a:r>
-                    </a:p>
-                  </a:txBody>
-                  <a:tcPr/>
-                </a:tc>
-                <a:tc>
-                  <a:txBody>
-                    <a:bodyPr/>
-                    <a:lstStyle/>
-                    <a:p>
-                      <a:r>
-                        <a:t>0</a:t>
                       </a:r>
                     </a:p>
                   </a:txBody>
@@ -3618,78 +3324,6 @@
                     <a:lstStyle/>
                     <a:p>
                       <a:r>
-                        <a:t>0</a:t>
-                      </a:r>
-                    </a:p>
-                  </a:txBody>
-                  <a:tcPr/>
-                </a:tc>
-                <a:tc>
-                  <a:txBody>
-                    <a:bodyPr/>
-                    <a:lstStyle/>
-                    <a:p>
-                      <a:r>
-                        <a:t>0</a:t>
-                      </a:r>
-                    </a:p>
-                  </a:txBody>
-                  <a:tcPr/>
-                </a:tc>
-                <a:tc>
-                  <a:txBody>
-                    <a:bodyPr/>
-                    <a:lstStyle/>
-                    <a:p>
-                      <a:r>
-                        <a:t>0</a:t>
-                      </a:r>
-                    </a:p>
-                  </a:txBody>
-                  <a:tcPr/>
-                </a:tc>
-                <a:tc>
-                  <a:txBody>
-                    <a:bodyPr/>
-                    <a:lstStyle/>
-                    <a:p>
-                      <a:r>
-                        <a:t>0</a:t>
-                      </a:r>
-                    </a:p>
-                  </a:txBody>
-                  <a:tcPr/>
-                </a:tc>
-                <a:tc>
-                  <a:txBody>
-                    <a:bodyPr/>
-                    <a:lstStyle/>
-                    <a:p>
-                      <a:r>
-                        <a:t>0</a:t>
-                      </a:r>
-                    </a:p>
-                  </a:txBody>
-                  <a:tcPr/>
-                </a:tc>
-                <a:tc>
-                  <a:txBody>
-                    <a:bodyPr/>
-                    <a:lstStyle/>
-                    <a:p>
-                      <a:r>
-                        <a:t>0</a:t>
-                      </a:r>
-                    </a:p>
-                  </a:txBody>
-                  <a:tcPr/>
-                </a:tc>
-                <a:tc>
-                  <a:txBody>
-                    <a:bodyPr/>
-                    <a:lstStyle/>
-                    <a:p>
-                      <a:r>
                         <a:t>4</a:t>
                       </a:r>
                     </a:p>
@@ -3728,79 +3362,7 @@
                     <a:lstStyle/>
                     <a:p>
                       <a:r>
-                        <a:t>3</a:t>
-                      </a:r>
-                    </a:p>
-                  </a:txBody>
-                  <a:tcPr/>
-                </a:tc>
-                <a:tc>
-                  <a:txBody>
-                    <a:bodyPr/>
-                    <a:lstStyle/>
-                    <a:p>
-                      <a:r>
-                        <a:t>93</a:t>
-                      </a:r>
-                    </a:p>
-                  </a:txBody>
-                  <a:tcPr/>
-                </a:tc>
-                <a:tc>
-                  <a:txBody>
-                    <a:bodyPr/>
-                    <a:lstStyle/>
-                    <a:p>
-                      <a:r>
-                        <a:t>91</a:t>
-                      </a:r>
-                    </a:p>
-                  </a:txBody>
-                  <a:tcPr/>
-                </a:tc>
-                <a:tc>
-                  <a:txBody>
-                    <a:bodyPr/>
-                    <a:lstStyle/>
-                    <a:p>
-                      <a:r>
-                        <a:t>22</a:t>
-                      </a:r>
-                    </a:p>
-                  </a:txBody>
-                  <a:tcPr/>
-                </a:tc>
-                <a:tc>
-                  <a:txBody>
-                    <a:bodyPr/>
-                    <a:lstStyle/>
-                    <a:p>
-                      <a:r>
-                        <a:t>23</a:t>
-                      </a:r>
-                    </a:p>
-                  </a:txBody>
-                  <a:tcPr/>
-                </a:tc>
-                <a:tc>
-                  <a:txBody>
-                    <a:bodyPr/>
-                    <a:lstStyle/>
-                    <a:p>
-                      <a:r>
-                        <a:t>2</a:t>
-                      </a:r>
-                    </a:p>
-                  </a:txBody>
-                  <a:tcPr/>
-                </a:tc>
-                <a:tc>
-                  <a:txBody>
-                    <a:bodyPr/>
-                    <a:lstStyle/>
-                    <a:p>
-                      <a:r>
-                        <a:t>16436</a:t>
+                        <a:t>16670</a:t>
                       </a:r>
                     </a:p>
                   </a:txBody>

</xml_diff>

<commit_message>
Optimize Learn Data for Horizontal Chunking
</commit_message>
<xml_diff>
--- a/FlaskApp/generated/Learn5.pptx
+++ b/FlaskApp/generated/Learn5.pptx
@@ -3134,257 +3134,6 @@
           </a:prstGeom>
         </p:spPr>
       </p:pic>
-      <p:graphicFrame>
-        <p:nvGraphicFramePr>
-          <p:cNvPr id="4" name="Table 3"/>
-          <p:cNvGraphicFramePr>
-            <a:graphicFrameLocks noGrp="1"/>
-          </p:cNvGraphicFramePr>
-          <p:nvPr/>
-        </p:nvGraphicFramePr>
-        <p:xfrm>
-          <a:off x="304495" y="1371600"/>
-          <a:ext cx="8686800" cy="1828800"/>
-        </p:xfrm>
-        <a:graphic>
-          <a:graphicData uri="http://schemas.openxmlformats.org/drawingml/2006/table">
-            <a:tbl>
-              <a:tblPr firstRow="1" bandRow="1">
-                <a:tableStyleId>{5C22544A-7EE6-4342-B048-85BDC9FD1C3A}</a:tableStyleId>
-              </a:tblPr>
-              <a:tblGrid>
-                <a:gridCol w="2895600"/>
-                <a:gridCol w="2895600"/>
-                <a:gridCol w="2895600"/>
-              </a:tblGrid>
-              <a:tr h="304800">
-                <a:tc>
-                  <a:txBody>
-                    <a:bodyPr/>
-                    <a:lstStyle/>
-                    <a:p/>
-                  </a:txBody>
-                  <a:tcPr/>
-                </a:tc>
-                <a:tc>
-                  <a:txBody>
-                    <a:bodyPr/>
-                    <a:lstStyle/>
-                    <a:p>
-                      <a:r>
-                        <a:t>Not on Learn</a:t>
-                      </a:r>
-                    </a:p>
-                  </a:txBody>
-                  <a:tcPr/>
-                </a:tc>
-                <a:tc>
-                  <a:txBody>
-                    <a:bodyPr/>
-                    <a:lstStyle/>
-                    <a:p>
-                      <a:r>
-                        <a:t>Total</a:t>
-                      </a:r>
-                    </a:p>
-                  </a:txBody>
-                  <a:tcPr/>
-                </a:tc>
-              </a:tr>
-              <a:tr h="304800">
-                <a:tc>
-                  <a:txBody>
-                    <a:bodyPr/>
-                    <a:lstStyle/>
-                    <a:p>
-                      <a:r>
-                        <a:t>Bangalore</a:t>
-                      </a:r>
-                    </a:p>
-                  </a:txBody>
-                  <a:tcPr/>
-                </a:tc>
-                <a:tc>
-                  <a:txBody>
-                    <a:bodyPr/>
-                    <a:lstStyle/>
-                    <a:p>
-                      <a:r>
-                        <a:t>16625</a:t>
-                      </a:r>
-                    </a:p>
-                  </a:txBody>
-                  <a:tcPr/>
-                </a:tc>
-                <a:tc>
-                  <a:txBody>
-                    <a:bodyPr/>
-                    <a:lstStyle/>
-                    <a:p>
-                      <a:r>
-                        <a:t>16625</a:t>
-                      </a:r>
-                    </a:p>
-                  </a:txBody>
-                  <a:tcPr/>
-                </a:tc>
-              </a:tr>
-              <a:tr h="304800">
-                <a:tc>
-                  <a:txBody>
-                    <a:bodyPr/>
-                    <a:lstStyle/>
-                    <a:p>
-                      <a:r>
-                        <a:t>Hyderabad</a:t>
-                      </a:r>
-                    </a:p>
-                  </a:txBody>
-                  <a:tcPr/>
-                </a:tc>
-                <a:tc>
-                  <a:txBody>
-                    <a:bodyPr/>
-                    <a:lstStyle/>
-                    <a:p>
-                      <a:r>
-                        <a:t>39</a:t>
-                      </a:r>
-                    </a:p>
-                  </a:txBody>
-                  <a:tcPr/>
-                </a:tc>
-                <a:tc>
-                  <a:txBody>
-                    <a:bodyPr/>
-                    <a:lstStyle/>
-                    <a:p>
-                      <a:r>
-                        <a:t>39</a:t>
-                      </a:r>
-                    </a:p>
-                  </a:txBody>
-                  <a:tcPr/>
-                </a:tc>
-              </a:tr>
-              <a:tr h="304800">
-                <a:tc>
-                  <a:txBody>
-                    <a:bodyPr/>
-                    <a:lstStyle/>
-                    <a:p>
-                      <a:r>
-                        <a:t>Administration</a:t>
-                      </a:r>
-                    </a:p>
-                  </a:txBody>
-                  <a:tcPr/>
-                </a:tc>
-                <a:tc>
-                  <a:txBody>
-                    <a:bodyPr/>
-                    <a:lstStyle/>
-                    <a:p>
-                      <a:r>
-                        <a:t>2</a:t>
-                      </a:r>
-                    </a:p>
-                  </a:txBody>
-                  <a:tcPr/>
-                </a:tc>
-                <a:tc>
-                  <a:txBody>
-                    <a:bodyPr/>
-                    <a:lstStyle/>
-                    <a:p>
-                      <a:r>
-                        <a:t>2</a:t>
-                      </a:r>
-                    </a:p>
-                  </a:txBody>
-                  <a:tcPr/>
-                </a:tc>
-              </a:tr>
-              <a:tr h="304800">
-                <a:tc>
-                  <a:txBody>
-                    <a:bodyPr/>
-                    <a:lstStyle/>
-                    <a:p>
-                      <a:r>
-                        <a:t>Delhi</a:t>
-                      </a:r>
-                    </a:p>
-                  </a:txBody>
-                  <a:tcPr/>
-                </a:tc>
-                <a:tc>
-                  <a:txBody>
-                    <a:bodyPr/>
-                    <a:lstStyle/>
-                    <a:p>
-                      <a:r>
-                        <a:t>4</a:t>
-                      </a:r>
-                    </a:p>
-                  </a:txBody>
-                  <a:tcPr/>
-                </a:tc>
-                <a:tc>
-                  <a:txBody>
-                    <a:bodyPr/>
-                    <a:lstStyle/>
-                    <a:p>
-                      <a:r>
-                        <a:t>4</a:t>
-                      </a:r>
-                    </a:p>
-                  </a:txBody>
-                  <a:tcPr/>
-                </a:tc>
-              </a:tr>
-              <a:tr h="304800">
-                <a:tc>
-                  <a:txBody>
-                    <a:bodyPr/>
-                    <a:lstStyle/>
-                    <a:p>
-                      <a:r>
-                        <a:t>Total</a:t>
-                      </a:r>
-                    </a:p>
-                  </a:txBody>
-                  <a:tcPr/>
-                </a:tc>
-                <a:tc>
-                  <a:txBody>
-                    <a:bodyPr/>
-                    <a:lstStyle/>
-                    <a:p>
-                      <a:r>
-                        <a:t>16670</a:t>
-                      </a:r>
-                    </a:p>
-                  </a:txBody>
-                  <a:tcPr/>
-                </a:tc>
-                <a:tc>
-                  <a:txBody>
-                    <a:bodyPr/>
-                    <a:lstStyle/>
-                    <a:p>
-                      <a:r>
-                        <a:t>16670</a:t>
-                      </a:r>
-                    </a:p>
-                  </a:txBody>
-                  <a:tcPr/>
-                </a:tc>
-              </a:tr>
-            </a:tbl>
-          </a:graphicData>
-        </a:graphic>
-      </p:graphicFrame>
     </p:spTree>
   </p:cSld>
   <p:clrMapOvr>

</xml_diff>